<commit_message>
STU1 Technical Correction (1.0.1) stage all changes
</commit_message>
<xml_diff>
--- a/input/images/CARINforBlueButtonProfileComparisonOverview.pptx
+++ b/input/images/CARINforBlueButtonProfileComparisonOverview.pptx
@@ -264,7 +264,7 @@
             <a:fld id="{1BCE7D1B-E2D6-42EC-A46F-6B8D8AB722EA}" type="datetime1">
               <a:rPr lang="en-US" altLang="en-US"/>
               <a:pPr/>
-              <a:t>10/28/20</a:t>
+              <a:t>1/26/2021</a:t>
             </a:fld>
             <a:endParaRPr lang="en-US" altLang="en-US"/>
           </a:p>
@@ -495,7 +495,7 @@
             <a:fld id="{60D4D74E-7671-46E5-9A5B-14F31A4C0D2E}" type="datetime1">
               <a:rPr lang="en-US" altLang="en-US"/>
               <a:pPr/>
-              <a:t>10/28/20</a:t>
+              <a:t>1/26/2021</a:t>
             </a:fld>
             <a:endParaRPr lang="en-US" altLang="en-US"/>
           </a:p>
@@ -1325,7 +1325,7 @@
           <a:p>
             <a:fld id="{23F303CC-BC6F-44EE-9A09-81F690F71D2E}" type="datetime1">
               <a:rPr lang="en-US" altLang="en-US" smtClean="0"/>
-              <a:t>10/28/20</a:t>
+              <a:t>1/26/2021</a:t>
             </a:fld>
             <a:endParaRPr lang="en-US" altLang="en-US" dirty="0"/>
           </a:p>
@@ -6129,7 +6129,7 @@
           <a:p>
             <a:fld id="{7CE3BD8C-C39F-4FFF-9CD5-05E4806DBFF3}" type="datetime1">
               <a:rPr lang="en-US" altLang="en-US" smtClean="0"/>
-              <a:t>10/28/20</a:t>
+              <a:t>1/26/2021</a:t>
             </a:fld>
             <a:endParaRPr lang="en-US" altLang="en-US"/>
           </a:p>
@@ -6686,12 +6686,20 @@
               <a:rPr lang="en-US" sz="2000" dirty="0"/>
               <a:t>EOB Profiles</a:t>
             </a:r>
+            <a:r>
+              <a:rPr lang="en-US" sz="1800" dirty="0"/>
+              <a:t/>
+            </a:r>
             <a:br>
               <a:rPr lang="en-US" sz="1800" dirty="0"/>
             </a:br>
             <a:r>
+              <a:rPr lang="en-US" sz="1600" dirty="0" smtClean="0"/>
+              <a:t>Align </a:t>
+            </a:r>
+            <a:r>
               <a:rPr lang="en-US" sz="1600" dirty="0"/>
-              <a:t>Aligned with Dept of Health &amp; Human Services Claim Submission Standards</a:t>
+              <a:t>with Dept of Health &amp; Human Services Claim Submission Standards</a:t>
             </a:r>
             <a:endParaRPr lang="en-US" sz="1800" dirty="0"/>
           </a:p>
@@ -6732,6 +6740,29 @@
           </a:p>
         </p:txBody>
       </p:sp>
+      <p:pic>
+        <p:nvPicPr>
+          <p:cNvPr id="8" name="Picture 7"/>
+          <p:cNvPicPr>
+            <a:picLocks noChangeAspect="1"/>
+          </p:cNvPicPr>
+          <p:nvPr/>
+        </p:nvPicPr>
+        <p:blipFill rotWithShape="1">
+          <a:blip r:embed="rId2"/>
+          <a:srcRect l="22500" t="28704" r="15417" b="16975"/>
+          <a:stretch/>
+        </p:blipFill>
+        <p:spPr>
+          <a:xfrm>
+            <a:off x="283447" y="908039"/>
+            <a:ext cx="8682754" cy="3702062"/>
+          </a:xfrm>
+          <a:prstGeom prst="rect">
+            <a:avLst/>
+          </a:prstGeom>
+        </p:spPr>
+      </p:pic>
       <p:sp>
         <p:nvSpPr>
           <p:cNvPr id="5" name="Slide Number Placeholder 4">
@@ -6762,66 +6793,6 @@
           </a:p>
         </p:txBody>
       </p:sp>
-      <p:pic>
-        <p:nvPicPr>
-          <p:cNvPr id="19" name="Picture 18">
-            <a:extLst>
-              <a:ext uri="{FF2B5EF4-FFF2-40B4-BE49-F238E27FC236}">
-                <a16:creationId xmlns:a16="http://schemas.microsoft.com/office/drawing/2014/main" id="{00252843-9AFC-4112-B9F4-6A333DEE448B}"/>
-              </a:ext>
-            </a:extLst>
-          </p:cNvPr>
-          <p:cNvPicPr>
-            <a:picLocks noChangeAspect="1"/>
-          </p:cNvPicPr>
-          <p:nvPr/>
-        </p:nvPicPr>
-        <p:blipFill>
-          <a:blip r:embed="rId2"/>
-          <a:stretch>
-            <a:fillRect/>
-          </a:stretch>
-        </p:blipFill>
-        <p:spPr>
-          <a:xfrm>
-            <a:off x="719755" y="786245"/>
-            <a:ext cx="7704490" cy="3688235"/>
-          </a:xfrm>
-          <a:prstGeom prst="rect">
-            <a:avLst/>
-          </a:prstGeom>
-        </p:spPr>
-      </p:pic>
-      <p:pic>
-        <p:nvPicPr>
-          <p:cNvPr id="21" name="Picture 20">
-            <a:extLst>
-              <a:ext uri="{FF2B5EF4-FFF2-40B4-BE49-F238E27FC236}">
-                <a16:creationId xmlns:a16="http://schemas.microsoft.com/office/drawing/2014/main" id="{A636189A-9723-4E85-8006-F1B0838CEB9B}"/>
-              </a:ext>
-            </a:extLst>
-          </p:cNvPr>
-          <p:cNvPicPr>
-            <a:picLocks noChangeAspect="1"/>
-          </p:cNvPicPr>
-          <p:nvPr/>
-        </p:nvPicPr>
-        <p:blipFill>
-          <a:blip r:embed="rId3"/>
-          <a:stretch>
-            <a:fillRect/>
-          </a:stretch>
-        </p:blipFill>
-        <p:spPr>
-          <a:xfrm>
-            <a:off x="719755" y="4404941"/>
-            <a:ext cx="7704490" cy="262517"/>
-          </a:xfrm>
-          <a:prstGeom prst="rect">
-            <a:avLst/>
-          </a:prstGeom>
-        </p:spPr>
-      </p:pic>
     </p:spTree>
     <p:extLst>
       <p:ext uri="{BB962C8B-B14F-4D97-AF65-F5344CB8AC3E}">
@@ -6832,6 +6803,13 @@
   <p:clrMapOvr>
     <a:masterClrMapping/>
   </p:clrMapOvr>
+  <p:timing>
+    <p:tnLst>
+      <p:par>
+        <p:cTn id="1" dur="indefinite" restart="never" nodeType="tmRoot"/>
+      </p:par>
+    </p:tnLst>
+  </p:timing>
 </p:sld>
 </file>
 
@@ -7794,6 +7772,21 @@
 </file>
 
 <file path=customXml/item1.xml><?xml version="1.0" encoding="utf-8"?>
+<?mso-contentType ?>
+<FormTemplates xmlns="http://schemas.microsoft.com/sharepoint/v3/contenttype/forms">
+  <Display>DocumentLibraryForm</Display>
+  <Edit>DocumentLibraryForm</Edit>
+  <New>DocumentLibraryForm</New>
+</FormTemplates>
+</file>
+
+<file path=customXml/item2.xml><?xml version="1.0" encoding="utf-8"?>
+<p:properties xmlns:p="http://schemas.microsoft.com/office/2006/metadata/properties" xmlns:xsi="http://www.w3.org/2001/XMLSchema-instance" xmlns:pc="http://schemas.microsoft.com/office/infopath/2007/PartnerControls">
+  <documentManagement/>
+</p:properties>
+</file>
+
+<file path=customXml/item3.xml><?xml version="1.0" encoding="utf-8"?>
 <ct:contentTypeSchema xmlns:ct="http://schemas.microsoft.com/office/2006/metadata/contentType" xmlns:ma="http://schemas.microsoft.com/office/2006/metadata/properties/metaAttributes" ct:_="" ma:_="" ma:contentTypeName="Document" ma:contentTypeID="0x0101003D0C67F1D0418E4D8CEA030F6226C240" ma:contentTypeVersion="13" ma:contentTypeDescription="Create a new document." ma:contentTypeScope="" ma:versionID="eacabd6a26b552791a79207640423285">
   <xsd:schema xmlns:xsd="http://www.w3.org/2001/XMLSchema" xmlns:xs="http://www.w3.org/2001/XMLSchema" xmlns:p="http://schemas.microsoft.com/office/2006/metadata/properties" xmlns:ns3="fd039111-a3d4-483d-82af-7ea19c5c1cff" xmlns:ns4="3441a4ca-e6b7-4eb7-9d37-d8bac3973302" targetNamespace="http://schemas.microsoft.com/office/2006/metadata/properties" ma:root="true" ma:fieldsID="142e8a5a503bd8014b1ea416b9465201" ns3:_="" ns4:_="">
     <xsd:import namespace="fd039111-a3d4-483d-82af-7ea19c5c1cff"/>
@@ -8016,22 +8009,32 @@
 </ct:contentTypeSchema>
 </file>
 
-<file path=customXml/item2.xml><?xml version="1.0" encoding="utf-8"?>
-<?mso-contentType ?>
-<FormTemplates xmlns="http://schemas.microsoft.com/sharepoint/v3/contenttype/forms">
-  <Display>DocumentLibraryForm</Display>
-  <Edit>DocumentLibraryForm</Edit>
-  <New>DocumentLibraryForm</New>
-</FormTemplates>
+<file path=customXml/itemProps1.xml><?xml version="1.0" encoding="utf-8"?>
+<ds:datastoreItem xmlns:ds="http://schemas.openxmlformats.org/officeDocument/2006/customXml" ds:itemID="{A21C8A99-0B06-4475-AE99-A1F9C0A19373}">
+  <ds:schemaRefs>
+    <ds:schemaRef ds:uri="http://schemas.microsoft.com/sharepoint/v3/contenttype/forms"/>
+  </ds:schemaRefs>
+</ds:datastoreItem>
 </file>
 
-<file path=customXml/item3.xml><?xml version="1.0" encoding="utf-8"?>
-<p:properties xmlns:p="http://schemas.microsoft.com/office/2006/metadata/properties" xmlns:xsi="http://www.w3.org/2001/XMLSchema-instance" xmlns:pc="http://schemas.microsoft.com/office/infopath/2007/PartnerControls">
-  <documentManagement/>
-</p:properties>
+<file path=customXml/itemProps2.xml><?xml version="1.0" encoding="utf-8"?>
+<ds:datastoreItem xmlns:ds="http://schemas.openxmlformats.org/officeDocument/2006/customXml" ds:itemID="{1A8B9704-4E07-47B0-BC95-BAEDDA36711F}">
+  <ds:schemaRefs>
+    <ds:schemaRef ds:uri="http://schemas.openxmlformats.org/package/2006/metadata/core-properties"/>
+    <ds:schemaRef ds:uri="http://purl.org/dc/elements/1.1/"/>
+    <ds:schemaRef ds:uri="http://schemas.microsoft.com/office/2006/metadata/properties"/>
+    <ds:schemaRef ds:uri="fd039111-a3d4-483d-82af-7ea19c5c1cff"/>
+    <ds:schemaRef ds:uri="http://purl.org/dc/terms/"/>
+    <ds:schemaRef ds:uri="http://schemas.microsoft.com/office/infopath/2007/PartnerControls"/>
+    <ds:schemaRef ds:uri="http://schemas.microsoft.com/office/2006/documentManagement/types"/>
+    <ds:schemaRef ds:uri="3441a4ca-e6b7-4eb7-9d37-d8bac3973302"/>
+    <ds:schemaRef ds:uri="http://www.w3.org/XML/1998/namespace"/>
+    <ds:schemaRef ds:uri="http://purl.org/dc/dcmitype/"/>
+  </ds:schemaRefs>
+</ds:datastoreItem>
 </file>
 
-<file path=customXml/itemProps1.xml><?xml version="1.0" encoding="utf-8"?>
+<file path=customXml/itemProps3.xml><?xml version="1.0" encoding="utf-8"?>
 <ds:datastoreItem xmlns:ds="http://schemas.openxmlformats.org/officeDocument/2006/customXml" ds:itemID="{B86E1474-AF3A-489C-A2A1-0B17F3BDDAF7}">
   <ds:schemaRefs>
     <ds:schemaRef ds:uri="http://schemas.microsoft.com/office/2006/metadata/contentType"/>
@@ -8048,29 +8051,4 @@
     <ds:schemaRef ds:uri="http://schemas.microsoft.com/internal/obd"/>
   </ds:schemaRefs>
 </ds:datastoreItem>
-</file>
-
-<file path=customXml/itemProps2.xml><?xml version="1.0" encoding="utf-8"?>
-<ds:datastoreItem xmlns:ds="http://schemas.openxmlformats.org/officeDocument/2006/customXml" ds:itemID="{A21C8A99-0B06-4475-AE99-A1F9C0A19373}">
-  <ds:schemaRefs>
-    <ds:schemaRef ds:uri="http://schemas.microsoft.com/sharepoint/v3/contenttype/forms"/>
-  </ds:schemaRefs>
-</ds:datastoreItem>
-</file>
-
-<file path=customXml/itemProps3.xml><?xml version="1.0" encoding="utf-8"?>
-<ds:datastoreItem xmlns:ds="http://schemas.openxmlformats.org/officeDocument/2006/customXml" ds:itemID="{1A8B9704-4E07-47B0-BC95-BAEDDA36711F}">
-  <ds:schemaRefs>
-    <ds:schemaRef ds:uri="http://purl.org/dc/terms/"/>
-    <ds:schemaRef ds:uri="http://purl.org/dc/dcmitype/"/>
-    <ds:schemaRef ds:uri="http://schemas.microsoft.com/office/infopath/2007/PartnerControls"/>
-    <ds:schemaRef ds:uri="http://schemas.microsoft.com/office/2006/documentManagement/types"/>
-    <ds:schemaRef ds:uri="3441a4ca-e6b7-4eb7-9d37-d8bac3973302"/>
-    <ds:schemaRef ds:uri="http://schemas.microsoft.com/office/2006/metadata/properties"/>
-    <ds:schemaRef ds:uri="http://purl.org/dc/elements/1.1/"/>
-    <ds:schemaRef ds:uri="fd039111-a3d4-483d-82af-7ea19c5c1cff"/>
-    <ds:schemaRef ds:uri="http://schemas.openxmlformats.org/package/2006/metadata/core-properties"/>
-    <ds:schemaRef ds:uri="http://www.w3.org/XML/1998/namespace"/>
-  </ds:schemaRefs>
-</ds:datastoreItem>
 </file>
</xml_diff>

<commit_message>
updated profile comparison for HIPPS
</commit_message>
<xml_diff>
--- a/input/images/CARINforBlueButtonProfileComparisonOverview.pptx
+++ b/input/images/CARINforBlueButtonProfileComparisonOverview.pptx
@@ -264,7 +264,7 @@
             <a:fld id="{1BCE7D1B-E2D6-42EC-A46F-6B8D8AB722EA}" type="datetime1">
               <a:rPr lang="en-US" altLang="en-US"/>
               <a:pPr/>
-              <a:t>1/26/2021</a:t>
+              <a:t>2/25/2021</a:t>
             </a:fld>
             <a:endParaRPr lang="en-US" altLang="en-US"/>
           </a:p>
@@ -495,7 +495,7 @@
             <a:fld id="{60D4D74E-7671-46E5-9A5B-14F31A4C0D2E}" type="datetime1">
               <a:rPr lang="en-US" altLang="en-US"/>
               <a:pPr/>
-              <a:t>1/26/2021</a:t>
+              <a:t>2/25/2021</a:t>
             </a:fld>
             <a:endParaRPr lang="en-US" altLang="en-US"/>
           </a:p>
@@ -1325,7 +1325,7 @@
           <a:p>
             <a:fld id="{23F303CC-BC6F-44EE-9A09-81F690F71D2E}" type="datetime1">
               <a:rPr lang="en-US" altLang="en-US" smtClean="0"/>
-              <a:t>1/26/2021</a:t>
+              <a:t>2/25/2021</a:t>
             </a:fld>
             <a:endParaRPr lang="en-US" altLang="en-US" dirty="0"/>
           </a:p>
@@ -6129,7 +6129,7 @@
           <a:p>
             <a:fld id="{7CE3BD8C-C39F-4FFF-9CD5-05E4806DBFF3}" type="datetime1">
               <a:rPr lang="en-US" altLang="en-US" smtClean="0"/>
-              <a:t>1/26/2021</a:t>
+              <a:t>2/25/2021</a:t>
             </a:fld>
             <a:endParaRPr lang="en-US" altLang="en-US"/>
           </a:p>
@@ -6740,29 +6740,6 @@
           </a:p>
         </p:txBody>
       </p:sp>
-      <p:pic>
-        <p:nvPicPr>
-          <p:cNvPr id="8" name="Picture 7"/>
-          <p:cNvPicPr>
-            <a:picLocks noChangeAspect="1"/>
-          </p:cNvPicPr>
-          <p:nvPr/>
-        </p:nvPicPr>
-        <p:blipFill rotWithShape="1">
-          <a:blip r:embed="rId2"/>
-          <a:srcRect l="22500" t="28704" r="15417" b="16975"/>
-          <a:stretch/>
-        </p:blipFill>
-        <p:spPr>
-          <a:xfrm>
-            <a:off x="283447" y="908039"/>
-            <a:ext cx="8682754" cy="3702062"/>
-          </a:xfrm>
-          <a:prstGeom prst="rect">
-            <a:avLst/>
-          </a:prstGeom>
-        </p:spPr>
-      </p:pic>
       <p:sp>
         <p:nvSpPr>
           <p:cNvPr id="5" name="Slide Number Placeholder 4">
@@ -6793,6 +6770,29 @@
           </a:p>
         </p:txBody>
       </p:sp>
+      <p:pic>
+        <p:nvPicPr>
+          <p:cNvPr id="3" name="Picture 2"/>
+          <p:cNvPicPr>
+            <a:picLocks noChangeAspect="1"/>
+          </p:cNvPicPr>
+          <p:nvPr/>
+        </p:nvPicPr>
+        <p:blipFill rotWithShape="1">
+          <a:blip r:embed="rId2"/>
+          <a:srcRect l="22519" t="28721" r="15465" b="15259"/>
+          <a:stretch/>
+        </p:blipFill>
+        <p:spPr>
+          <a:xfrm>
+            <a:off x="238539" y="863781"/>
+            <a:ext cx="8722581" cy="3676414"/>
+          </a:xfrm>
+          <a:prstGeom prst="rect">
+            <a:avLst/>
+          </a:prstGeom>
+        </p:spPr>
+      </p:pic>
     </p:spTree>
     <p:extLst>
       <p:ext uri="{BB962C8B-B14F-4D97-AF65-F5344CB8AC3E}">
@@ -7772,21 +7772,6 @@
 </file>
 
 <file path=customXml/item1.xml><?xml version="1.0" encoding="utf-8"?>
-<?mso-contentType ?>
-<FormTemplates xmlns="http://schemas.microsoft.com/sharepoint/v3/contenttype/forms">
-  <Display>DocumentLibraryForm</Display>
-  <Edit>DocumentLibraryForm</Edit>
-  <New>DocumentLibraryForm</New>
-</FormTemplates>
-</file>
-
-<file path=customXml/item2.xml><?xml version="1.0" encoding="utf-8"?>
-<p:properties xmlns:p="http://schemas.microsoft.com/office/2006/metadata/properties" xmlns:xsi="http://www.w3.org/2001/XMLSchema-instance" xmlns:pc="http://schemas.microsoft.com/office/infopath/2007/PartnerControls">
-  <documentManagement/>
-</p:properties>
-</file>
-
-<file path=customXml/item3.xml><?xml version="1.0" encoding="utf-8"?>
 <ct:contentTypeSchema xmlns:ct="http://schemas.microsoft.com/office/2006/metadata/contentType" xmlns:ma="http://schemas.microsoft.com/office/2006/metadata/properties/metaAttributes" ct:_="" ma:_="" ma:contentTypeName="Document" ma:contentTypeID="0x0101003D0C67F1D0418E4D8CEA030F6226C240" ma:contentTypeVersion="13" ma:contentTypeDescription="Create a new document." ma:contentTypeScope="" ma:versionID="eacabd6a26b552791a79207640423285">
   <xsd:schema xmlns:xsd="http://www.w3.org/2001/XMLSchema" xmlns:xs="http://www.w3.org/2001/XMLSchema" xmlns:p="http://schemas.microsoft.com/office/2006/metadata/properties" xmlns:ns3="fd039111-a3d4-483d-82af-7ea19c5c1cff" xmlns:ns4="3441a4ca-e6b7-4eb7-9d37-d8bac3973302" targetNamespace="http://schemas.microsoft.com/office/2006/metadata/properties" ma:root="true" ma:fieldsID="142e8a5a503bd8014b1ea416b9465201" ns3:_="" ns4:_="">
     <xsd:import namespace="fd039111-a3d4-483d-82af-7ea19c5c1cff"/>
@@ -8009,32 +7994,22 @@
 </ct:contentTypeSchema>
 </file>
 
-<file path=customXml/itemProps1.xml><?xml version="1.0" encoding="utf-8"?>
-<ds:datastoreItem xmlns:ds="http://schemas.openxmlformats.org/officeDocument/2006/customXml" ds:itemID="{A21C8A99-0B06-4475-AE99-A1F9C0A19373}">
-  <ds:schemaRefs>
-    <ds:schemaRef ds:uri="http://schemas.microsoft.com/sharepoint/v3/contenttype/forms"/>
-  </ds:schemaRefs>
-</ds:datastoreItem>
+<file path=customXml/item2.xml><?xml version="1.0" encoding="utf-8"?>
+<p:properties xmlns:p="http://schemas.microsoft.com/office/2006/metadata/properties" xmlns:xsi="http://www.w3.org/2001/XMLSchema-instance" xmlns:pc="http://schemas.microsoft.com/office/infopath/2007/PartnerControls">
+  <documentManagement/>
+</p:properties>
 </file>
 
-<file path=customXml/itemProps2.xml><?xml version="1.0" encoding="utf-8"?>
-<ds:datastoreItem xmlns:ds="http://schemas.openxmlformats.org/officeDocument/2006/customXml" ds:itemID="{1A8B9704-4E07-47B0-BC95-BAEDDA36711F}">
-  <ds:schemaRefs>
-    <ds:schemaRef ds:uri="http://schemas.openxmlformats.org/package/2006/metadata/core-properties"/>
-    <ds:schemaRef ds:uri="http://purl.org/dc/elements/1.1/"/>
-    <ds:schemaRef ds:uri="http://schemas.microsoft.com/office/2006/metadata/properties"/>
-    <ds:schemaRef ds:uri="fd039111-a3d4-483d-82af-7ea19c5c1cff"/>
-    <ds:schemaRef ds:uri="http://purl.org/dc/terms/"/>
-    <ds:schemaRef ds:uri="http://schemas.microsoft.com/office/infopath/2007/PartnerControls"/>
-    <ds:schemaRef ds:uri="http://schemas.microsoft.com/office/2006/documentManagement/types"/>
-    <ds:schemaRef ds:uri="3441a4ca-e6b7-4eb7-9d37-d8bac3973302"/>
-    <ds:schemaRef ds:uri="http://www.w3.org/XML/1998/namespace"/>
-    <ds:schemaRef ds:uri="http://purl.org/dc/dcmitype/"/>
-  </ds:schemaRefs>
-</ds:datastoreItem>
+<file path=customXml/item3.xml><?xml version="1.0" encoding="utf-8"?>
+<?mso-contentType ?>
+<FormTemplates xmlns="http://schemas.microsoft.com/sharepoint/v3/contenttype/forms">
+  <Display>DocumentLibraryForm</Display>
+  <Edit>DocumentLibraryForm</Edit>
+  <New>DocumentLibraryForm</New>
+</FormTemplates>
 </file>
 
-<file path=customXml/itemProps3.xml><?xml version="1.0" encoding="utf-8"?>
+<file path=customXml/itemProps1.xml><?xml version="1.0" encoding="utf-8"?>
 <ds:datastoreItem xmlns:ds="http://schemas.openxmlformats.org/officeDocument/2006/customXml" ds:itemID="{B86E1474-AF3A-489C-A2A1-0B17F3BDDAF7}">
   <ds:schemaRefs>
     <ds:schemaRef ds:uri="http://schemas.microsoft.com/office/2006/metadata/contentType"/>
@@ -8051,4 +8026,29 @@
     <ds:schemaRef ds:uri="http://schemas.microsoft.com/internal/obd"/>
   </ds:schemaRefs>
 </ds:datastoreItem>
+</file>
+
+<file path=customXml/itemProps2.xml><?xml version="1.0" encoding="utf-8"?>
+<ds:datastoreItem xmlns:ds="http://schemas.openxmlformats.org/officeDocument/2006/customXml" ds:itemID="{1A8B9704-4E07-47B0-BC95-BAEDDA36711F}">
+  <ds:schemaRefs>
+    <ds:schemaRef ds:uri="http://purl.org/dc/terms/"/>
+    <ds:schemaRef ds:uri="http://schemas.openxmlformats.org/package/2006/metadata/core-properties"/>
+    <ds:schemaRef ds:uri="http://schemas.microsoft.com/office/2006/documentManagement/types"/>
+    <ds:schemaRef ds:uri="http://schemas.microsoft.com/office/infopath/2007/PartnerControls"/>
+    <ds:schemaRef ds:uri="http://purl.org/dc/elements/1.1/"/>
+    <ds:schemaRef ds:uri="http://schemas.microsoft.com/office/2006/metadata/properties"/>
+    <ds:schemaRef ds:uri="fd039111-a3d4-483d-82af-7ea19c5c1cff"/>
+    <ds:schemaRef ds:uri="3441a4ca-e6b7-4eb7-9d37-d8bac3973302"/>
+    <ds:schemaRef ds:uri="http://www.w3.org/XML/1998/namespace"/>
+    <ds:schemaRef ds:uri="http://purl.org/dc/dcmitype/"/>
+  </ds:schemaRefs>
+</ds:datastoreItem>
+</file>
+
+<file path=customXml/itemProps3.xml><?xml version="1.0" encoding="utf-8"?>
+<ds:datastoreItem xmlns:ds="http://schemas.openxmlformats.org/officeDocument/2006/customXml" ds:itemID="{A21C8A99-0B06-4475-AE99-A1F9C0A19373}">
+  <ds:schemaRefs>
+    <ds:schemaRef ds:uri="http://schemas.microsoft.com/sharepoint/v3/contenttype/forms"/>
+  </ds:schemaRefs>
+</ds:datastoreItem>
 </file>
</xml_diff>

<commit_message>
contained Organization and various changes
</commit_message>
<xml_diff>
--- a/input/images/CARINforBlueButtonProfileComparisonOverview.pptx
+++ b/input/images/CARINforBlueButtonProfileComparisonOverview.pptx
@@ -11,7 +11,7 @@
     <p:handoutMasterId r:id="rId7"/>
   </p:handoutMasterIdLst>
   <p:sldIdLst>
-    <p:sldId id="2724" r:id="rId5"/>
+    <p:sldId id="2725" r:id="rId5"/>
   </p:sldIdLst>
   <p:sldSz cx="9144000" cy="5143500" type="screen16x9"/>
   <p:notesSz cx="6858000" cy="9144000"/>
@@ -264,7 +264,7 @@
             <a:fld id="{1BCE7D1B-E2D6-42EC-A46F-6B8D8AB722EA}" type="datetime1">
               <a:rPr lang="en-US" altLang="en-US"/>
               <a:pPr/>
-              <a:t>2/25/2021</a:t>
+              <a:t>7/2/22</a:t>
             </a:fld>
             <a:endParaRPr lang="en-US" altLang="en-US"/>
           </a:p>
@@ -495,7 +495,7 @@
             <a:fld id="{60D4D74E-7671-46E5-9A5B-14F31A4C0D2E}" type="datetime1">
               <a:rPr lang="en-US" altLang="en-US"/>
               <a:pPr/>
-              <a:t>2/25/2021</a:t>
+              <a:t>7/2/22</a:t>
             </a:fld>
             <a:endParaRPr lang="en-US" altLang="en-US"/>
           </a:p>
@@ -1325,7 +1325,7 @@
           <a:p>
             <a:fld id="{23F303CC-BC6F-44EE-9A09-81F690F71D2E}" type="datetime1">
               <a:rPr lang="en-US" altLang="en-US" smtClean="0"/>
-              <a:t>2/25/2021</a:t>
+              <a:t>7/2/22</a:t>
             </a:fld>
             <a:endParaRPr lang="en-US" altLang="en-US" dirty="0"/>
           </a:p>
@@ -6129,7 +6129,7 @@
           <a:p>
             <a:fld id="{7CE3BD8C-C39F-4FFF-9CD5-05E4806DBFF3}" type="datetime1">
               <a:rPr lang="en-US" altLang="en-US" smtClean="0"/>
-              <a:t>2/25/2021</a:t>
+              <a:t>7/2/22</a:t>
             </a:fld>
             <a:endParaRPr lang="en-US" altLang="en-US"/>
           </a:p>
@@ -6686,20 +6686,12 @@
               <a:rPr lang="en-US" sz="2000" dirty="0"/>
               <a:t>EOB Profiles</a:t>
             </a:r>
-            <a:r>
-              <a:rPr lang="en-US" sz="1800" dirty="0"/>
-              <a:t/>
-            </a:r>
             <a:br>
               <a:rPr lang="en-US" sz="1800" dirty="0"/>
             </a:br>
             <a:r>
-              <a:rPr lang="en-US" sz="1600" dirty="0" smtClean="0"/>
-              <a:t>Align </a:t>
-            </a:r>
-            <a:r>
               <a:rPr lang="en-US" sz="1600" dirty="0"/>
-              <a:t>with Dept of Health &amp; Human Services Claim Submission Standards</a:t>
+              <a:t>Align with Dept of Health &amp; Human Services Claim Submission Standards</a:t>
             </a:r>
             <a:endParaRPr lang="en-US" sz="1800" dirty="0"/>
           </a:p>
@@ -6772,7 +6764,7 @@
       </p:sp>
       <p:pic>
         <p:nvPicPr>
-          <p:cNvPr id="3" name="Picture 2"/>
+          <p:cNvPr id="9" name="Picture 8"/>
           <p:cNvPicPr>
             <a:picLocks noChangeAspect="1"/>
           </p:cNvPicPr>
@@ -6780,13 +6772,13 @@
         </p:nvPicPr>
         <p:blipFill rotWithShape="1">
           <a:blip r:embed="rId2"/>
-          <a:srcRect l="22519" t="28721" r="15465" b="15259"/>
+          <a:srcRect l="22633" t="28586" r="15526" b="15273"/>
           <a:stretch/>
         </p:blipFill>
         <p:spPr>
           <a:xfrm>
-            <a:off x="238539" y="863781"/>
-            <a:ext cx="8722581" cy="3676414"/>
+            <a:off x="221580" y="1074649"/>
+            <a:ext cx="8778041" cy="3433183"/>
           </a:xfrm>
           <a:prstGeom prst="rect">
             <a:avLst/>
@@ -6796,20 +6788,13 @@
     </p:spTree>
     <p:extLst>
       <p:ext uri="{BB962C8B-B14F-4D97-AF65-F5344CB8AC3E}">
-        <p14:creationId xmlns:p14="http://schemas.microsoft.com/office/powerpoint/2010/main" val="2421107156"/>
+        <p14:creationId xmlns:p14="http://schemas.microsoft.com/office/powerpoint/2010/main" val="1833943241"/>
       </p:ext>
     </p:extLst>
   </p:cSld>
   <p:clrMapOvr>
     <a:masterClrMapping/>
   </p:clrMapOvr>
-  <p:timing>
-    <p:tnLst>
-      <p:par>
-        <p:cTn id="1" dur="indefinite" restart="never" nodeType="tmRoot"/>
-      </p:par>
-    </p:tnLst>
-  </p:timing>
 </p:sld>
 </file>
 
@@ -7772,6 +7757,21 @@
 </file>
 
 <file path=customXml/item1.xml><?xml version="1.0" encoding="utf-8"?>
+<?mso-contentType ?>
+<FormTemplates xmlns="http://schemas.microsoft.com/sharepoint/v3/contenttype/forms">
+  <Display>DocumentLibraryForm</Display>
+  <Edit>DocumentLibraryForm</Edit>
+  <New>DocumentLibraryForm</New>
+</FormTemplates>
+</file>
+
+<file path=customXml/item2.xml><?xml version="1.0" encoding="utf-8"?>
+<p:properties xmlns:p="http://schemas.microsoft.com/office/2006/metadata/properties" xmlns:xsi="http://www.w3.org/2001/XMLSchema-instance" xmlns:pc="http://schemas.microsoft.com/office/infopath/2007/PartnerControls">
+  <documentManagement/>
+</p:properties>
+</file>
+
+<file path=customXml/item3.xml><?xml version="1.0" encoding="utf-8"?>
 <ct:contentTypeSchema xmlns:ct="http://schemas.microsoft.com/office/2006/metadata/contentType" xmlns:ma="http://schemas.microsoft.com/office/2006/metadata/properties/metaAttributes" ct:_="" ma:_="" ma:contentTypeName="Document" ma:contentTypeID="0x0101003D0C67F1D0418E4D8CEA030F6226C240" ma:contentTypeVersion="13" ma:contentTypeDescription="Create a new document." ma:contentTypeScope="" ma:versionID="eacabd6a26b552791a79207640423285">
   <xsd:schema xmlns:xsd="http://www.w3.org/2001/XMLSchema" xmlns:xs="http://www.w3.org/2001/XMLSchema" xmlns:p="http://schemas.microsoft.com/office/2006/metadata/properties" xmlns:ns3="fd039111-a3d4-483d-82af-7ea19c5c1cff" xmlns:ns4="3441a4ca-e6b7-4eb7-9d37-d8bac3973302" targetNamespace="http://schemas.microsoft.com/office/2006/metadata/properties" ma:root="true" ma:fieldsID="142e8a5a503bd8014b1ea416b9465201" ns3:_="" ns4:_="">
     <xsd:import namespace="fd039111-a3d4-483d-82af-7ea19c5c1cff"/>
@@ -7994,36 +7994,10 @@
 </ct:contentTypeSchema>
 </file>
 
-<file path=customXml/item2.xml><?xml version="1.0" encoding="utf-8"?>
-<p:properties xmlns:p="http://schemas.microsoft.com/office/2006/metadata/properties" xmlns:xsi="http://www.w3.org/2001/XMLSchema-instance" xmlns:pc="http://schemas.microsoft.com/office/infopath/2007/PartnerControls">
-  <documentManagement/>
-</p:properties>
-</file>
-
-<file path=customXml/item3.xml><?xml version="1.0" encoding="utf-8"?>
-<?mso-contentType ?>
-<FormTemplates xmlns="http://schemas.microsoft.com/sharepoint/v3/contenttype/forms">
-  <Display>DocumentLibraryForm</Display>
-  <Edit>DocumentLibraryForm</Edit>
-  <New>DocumentLibraryForm</New>
-</FormTemplates>
-</file>
-
 <file path=customXml/itemProps1.xml><?xml version="1.0" encoding="utf-8"?>
-<ds:datastoreItem xmlns:ds="http://schemas.openxmlformats.org/officeDocument/2006/customXml" ds:itemID="{B86E1474-AF3A-489C-A2A1-0B17F3BDDAF7}">
+<ds:datastoreItem xmlns:ds="http://schemas.openxmlformats.org/officeDocument/2006/customXml" ds:itemID="{A21C8A99-0B06-4475-AE99-A1F9C0A19373}">
   <ds:schemaRefs>
-    <ds:schemaRef ds:uri="http://schemas.microsoft.com/office/2006/metadata/contentType"/>
-    <ds:schemaRef ds:uri="http://schemas.microsoft.com/office/2006/metadata/properties/metaAttributes"/>
-    <ds:schemaRef ds:uri="http://www.w3.org/2001/XMLSchema"/>
-    <ds:schemaRef ds:uri="http://schemas.microsoft.com/office/2006/metadata/properties"/>
-    <ds:schemaRef ds:uri="fd039111-a3d4-483d-82af-7ea19c5c1cff"/>
-    <ds:schemaRef ds:uri="3441a4ca-e6b7-4eb7-9d37-d8bac3973302"/>
-    <ds:schemaRef ds:uri="http://schemas.microsoft.com/office/2006/documentManagement/types"/>
-    <ds:schemaRef ds:uri="http://schemas.microsoft.com/office/infopath/2007/PartnerControls"/>
-    <ds:schemaRef ds:uri="http://schemas.openxmlformats.org/package/2006/metadata/core-properties"/>
-    <ds:schemaRef ds:uri="http://purl.org/dc/elements/1.1/"/>
-    <ds:schemaRef ds:uri="http://purl.org/dc/terms/"/>
-    <ds:schemaRef ds:uri="http://schemas.microsoft.com/internal/obd"/>
+    <ds:schemaRef ds:uri="http://schemas.microsoft.com/sharepoint/v3/contenttype/forms"/>
   </ds:schemaRefs>
 </ds:datastoreItem>
 </file>
@@ -8046,9 +8020,20 @@
 </file>
 
 <file path=customXml/itemProps3.xml><?xml version="1.0" encoding="utf-8"?>
-<ds:datastoreItem xmlns:ds="http://schemas.openxmlformats.org/officeDocument/2006/customXml" ds:itemID="{A21C8A99-0B06-4475-AE99-A1F9C0A19373}">
+<ds:datastoreItem xmlns:ds="http://schemas.openxmlformats.org/officeDocument/2006/customXml" ds:itemID="{B86E1474-AF3A-489C-A2A1-0B17F3BDDAF7}">
   <ds:schemaRefs>
-    <ds:schemaRef ds:uri="http://schemas.microsoft.com/sharepoint/v3/contenttype/forms"/>
+    <ds:schemaRef ds:uri="http://schemas.microsoft.com/office/2006/metadata/contentType"/>
+    <ds:schemaRef ds:uri="http://schemas.microsoft.com/office/2006/metadata/properties/metaAttributes"/>
+    <ds:schemaRef ds:uri="http://www.w3.org/2001/XMLSchema"/>
+    <ds:schemaRef ds:uri="http://schemas.microsoft.com/office/2006/metadata/properties"/>
+    <ds:schemaRef ds:uri="fd039111-a3d4-483d-82af-7ea19c5c1cff"/>
+    <ds:schemaRef ds:uri="3441a4ca-e6b7-4eb7-9d37-d8bac3973302"/>
+    <ds:schemaRef ds:uri="http://schemas.microsoft.com/office/2006/documentManagement/types"/>
+    <ds:schemaRef ds:uri="http://schemas.microsoft.com/office/infopath/2007/PartnerControls"/>
+    <ds:schemaRef ds:uri="http://schemas.openxmlformats.org/package/2006/metadata/core-properties"/>
+    <ds:schemaRef ds:uri="http://purl.org/dc/elements/1.1/"/>
+    <ds:schemaRef ds:uri="http://purl.org/dc/terms/"/>
+    <ds:schemaRef ds:uri="http://schemas.microsoft.com/internal/obd"/>
   </ds:schemaRefs>
 </ds:datastoreItem>
 </file>
</xml_diff>